<commit_message>
Fix figures in Sec 21, 23, and 27
</commit_message>
<xml_diff>
--- a/ITI/TF/Volume1/media/Figure_21.1-1.pptx
+++ b/ITI/TF/Volume1/media/Figure_21.1-1.pptx
@@ -104,6 +104,11 @@
       </a:defRPr>
     </a:lvl9pPr>
   </p:defaultTextStyle>
+  <p:extLst>
+    <p:ext uri="{EFAFB233-063F-42B5-8137-9DF3F51BA10A}">
+      <p15:sldGuideLst xmlns:p15="http://schemas.microsoft.com/office/powerpoint/2012/main"/>
+    </p:ext>
+  </p:extLst>
 </p:presentation>
 </file>
 
@@ -254,7 +259,7 @@
           <a:p>
             <a:fld id="{37F0D512-35D5-5548-88E2-017A3685D7AF}" type="datetimeFigureOut">
               <a:rPr lang="en-US" smtClean="0"/>
-              <a:t>8/12/20</a:t>
+              <a:t>8/26/20</a:t>
             </a:fld>
             <a:endParaRPr lang="en-US"/>
           </a:p>
@@ -452,7 +457,7 @@
           <a:p>
             <a:fld id="{37F0D512-35D5-5548-88E2-017A3685D7AF}" type="datetimeFigureOut">
               <a:rPr lang="en-US" smtClean="0"/>
-              <a:t>8/12/20</a:t>
+              <a:t>8/26/20</a:t>
             </a:fld>
             <a:endParaRPr lang="en-US"/>
           </a:p>
@@ -660,7 +665,7 @@
           <a:p>
             <a:fld id="{37F0D512-35D5-5548-88E2-017A3685D7AF}" type="datetimeFigureOut">
               <a:rPr lang="en-US" smtClean="0"/>
-              <a:t>8/12/20</a:t>
+              <a:t>8/26/20</a:t>
             </a:fld>
             <a:endParaRPr lang="en-US"/>
           </a:p>
@@ -858,7 +863,7 @@
           <a:p>
             <a:fld id="{37F0D512-35D5-5548-88E2-017A3685D7AF}" type="datetimeFigureOut">
               <a:rPr lang="en-US" smtClean="0"/>
-              <a:t>8/12/20</a:t>
+              <a:t>8/26/20</a:t>
             </a:fld>
             <a:endParaRPr lang="en-US"/>
           </a:p>
@@ -1133,7 +1138,7 @@
           <a:p>
             <a:fld id="{37F0D512-35D5-5548-88E2-017A3685D7AF}" type="datetimeFigureOut">
               <a:rPr lang="en-US" smtClean="0"/>
-              <a:t>8/12/20</a:t>
+              <a:t>8/26/20</a:t>
             </a:fld>
             <a:endParaRPr lang="en-US"/>
           </a:p>
@@ -1398,7 +1403,7 @@
           <a:p>
             <a:fld id="{37F0D512-35D5-5548-88E2-017A3685D7AF}" type="datetimeFigureOut">
               <a:rPr lang="en-US" smtClean="0"/>
-              <a:t>8/12/20</a:t>
+              <a:t>8/26/20</a:t>
             </a:fld>
             <a:endParaRPr lang="en-US"/>
           </a:p>
@@ -1810,7 +1815,7 @@
           <a:p>
             <a:fld id="{37F0D512-35D5-5548-88E2-017A3685D7AF}" type="datetimeFigureOut">
               <a:rPr lang="en-US" smtClean="0"/>
-              <a:t>8/12/20</a:t>
+              <a:t>8/26/20</a:t>
             </a:fld>
             <a:endParaRPr lang="en-US"/>
           </a:p>
@@ -1951,7 +1956,7 @@
           <a:p>
             <a:fld id="{37F0D512-35D5-5548-88E2-017A3685D7AF}" type="datetimeFigureOut">
               <a:rPr lang="en-US" smtClean="0"/>
-              <a:t>8/12/20</a:t>
+              <a:t>8/26/20</a:t>
             </a:fld>
             <a:endParaRPr lang="en-US"/>
           </a:p>
@@ -2064,7 +2069,7 @@
           <a:p>
             <a:fld id="{37F0D512-35D5-5548-88E2-017A3685D7AF}" type="datetimeFigureOut">
               <a:rPr lang="en-US" smtClean="0"/>
-              <a:t>8/12/20</a:t>
+              <a:t>8/26/20</a:t>
             </a:fld>
             <a:endParaRPr lang="en-US"/>
           </a:p>
@@ -2375,7 +2380,7 @@
           <a:p>
             <a:fld id="{37F0D512-35D5-5548-88E2-017A3685D7AF}" type="datetimeFigureOut">
               <a:rPr lang="en-US" smtClean="0"/>
-              <a:t>8/12/20</a:t>
+              <a:t>8/26/20</a:t>
             </a:fld>
             <a:endParaRPr lang="en-US"/>
           </a:p>
@@ -2663,7 +2668,7 @@
           <a:p>
             <a:fld id="{37F0D512-35D5-5548-88E2-017A3685D7AF}" type="datetimeFigureOut">
               <a:rPr lang="en-US" smtClean="0"/>
-              <a:t>8/12/20</a:t>
+              <a:t>8/26/20</a:t>
             </a:fld>
             <a:endParaRPr lang="en-US"/>
           </a:p>
@@ -2904,7 +2909,7 @@
           <a:p>
             <a:fld id="{37F0D512-35D5-5548-88E2-017A3685D7AF}" type="datetimeFigureOut">
               <a:rPr lang="en-US" smtClean="0"/>
-              <a:t>8/12/20</a:t>
+              <a:t>8/26/20</a:t>
             </a:fld>
             <a:endParaRPr lang="en-US"/>
           </a:p>
@@ -3345,6 +3350,162 @@
         </p:grpSpPr>
         <p:sp>
           <p:nvSpPr>
+            <p:cNvPr id="11" name="Text Box 20">
+              <a:extLst>
+                <a:ext uri="{FF2B5EF4-FFF2-40B4-BE49-F238E27FC236}">
+                  <a16:creationId xmlns:a16="http://schemas.microsoft.com/office/drawing/2014/main" id="{B36BE77E-DEB3-824B-89B5-71FACF88A51F}"/>
+                </a:ext>
+              </a:extLst>
+            </p:cNvPr>
+            <p:cNvSpPr txBox="1">
+              <a:spLocks noChangeArrowheads="1"/>
+            </p:cNvSpPr>
+            <p:nvPr/>
+          </p:nvSpPr>
+          <p:spPr bwMode="auto">
+            <a:xfrm>
+              <a:off x="17160" y="16357"/>
+              <a:ext cx="21348" cy="4616"/>
+            </a:xfrm>
+            <a:prstGeom prst="rect">
+              <a:avLst/>
+            </a:prstGeom>
+            <a:solidFill>
+              <a:srgbClr val="FFFFFF"/>
+            </a:solidFill>
+            <a:ln>
+              <a:noFill/>
+            </a:ln>
+            <a:extLst>
+              <a:ext uri="{91240B29-F687-4f45-9708-019B960494DF}">
+                <a14:hiddenLine xmlns:lc="http://schemas.openxmlformats.org/drawingml/2006/lockedCanvas" xmlns="" xmlns:mo="http://schemas.microsoft.com/office/mac/office/2008/main" xmlns:mv="urn:schemas-microsoft-com:mac:vml" xmlns:o="urn:schemas-microsoft-com:office:office" xmlns:v="urn:schemas-microsoft-com:vml" xmlns:w10="urn:schemas-microsoft-com:office:word" xmlns:w="http://schemas.openxmlformats.org/wordprocessingml/2006/main" xmlns:a14="http://schemas.microsoft.com/office/drawing/2010/main" xmlns:wps="http://schemas.microsoft.com/office/word/2010/wordprocessingShape" xmlns:wne="http://schemas.microsoft.com/office/word/2006/wordml" xmlns:wpi="http://schemas.microsoft.com/office/word/2010/wordprocessingInk" xmlns:wpg="http://schemas.microsoft.com/office/word/2010/wordprocessingGroup" xmlns:w16se="http://schemas.microsoft.com/office/word/2015/wordml/symex" xmlns:w16="http://schemas.microsoft.com/office/word/2018/wordml" xmlns:w16cid="http://schemas.microsoft.com/office/word/2016/wordml/cid" xmlns:w16cex="http://schemas.microsoft.com/office/word/2018/wordml/cex" xmlns:w15="http://schemas.microsoft.com/office/word/2012/wordml" xmlns:w14="http://schemas.microsoft.com/office/word/2010/wordml" xmlns:wp="http://schemas.openxmlformats.org/drawingml/2006/wordprocessingDrawing" xmlns:wp14="http://schemas.microsoft.com/office/word/2010/wordprocessingDrawing" xmlns:m="http://schemas.openxmlformats.org/officeDocument/2006/math" xmlns:am3d="http://schemas.microsoft.com/office/drawing/2017/model3d" xmlns:aink="http://schemas.microsoft.com/office/drawing/2016/ink" xmlns:mc="http://schemas.openxmlformats.org/markup-compatibility/2006" xmlns:cx8="http://schemas.microsoft.com/office/drawing/2016/5/14/chartex" xmlns:cx7="http://schemas.microsoft.com/office/drawing/2016/5/13/chartex" xmlns:cx6="http://schemas.microsoft.com/office/drawing/2016/5/12/chartex" xmlns:cx5="http://schemas.microsoft.com/office/drawing/2016/5/11/chartex" xmlns:cx4="http://schemas.microsoft.com/office/drawing/2016/5/10/chartex" xmlns:cx3="http://schemas.microsoft.com/office/drawing/2016/5/9/chartex" xmlns:cx2="http://schemas.microsoft.com/office/drawing/2015/10/21/chartex" xmlns:cx1="http://schemas.microsoft.com/office/drawing/2015/9/8/chartex" xmlns:cx="http://schemas.microsoft.com/office/drawing/2014/chartex" xmlns:wpc="http://schemas.microsoft.com/office/word/2010/wordprocessingCanvas" w="9525">
+                  <a:solidFill>
+                    <a:srgbClr val="000000"/>
+                  </a:solidFill>
+                  <a:miter lim="800000"/>
+                  <a:headEnd/>
+                  <a:tailEnd/>
+                </a14:hiddenLine>
+              </a:ext>
+            </a:extLst>
+          </p:spPr>
+          <p:txBody>
+            <a:bodyPr rot="0" vert="horz" wrap="square" lIns="91440" tIns="45720" rIns="91440" bIns="45720" anchor="t" anchorCtr="0" upright="1">
+              <a:noAutofit/>
+            </a:bodyPr>
+            <a:lstStyle/>
+            <a:p>
+              <a:pPr marL="0" marR="0">
+                <a:spcBef>
+                  <a:spcPts val="600"/>
+                </a:spcBef>
+                <a:spcAft>
+                  <a:spcPts val="0"/>
+                </a:spcAft>
+              </a:pPr>
+              <a:r>
+                <a:rPr lang="en-US" sz="1000" dirty="0">
+                  <a:effectLst/>
+                  <a:latin typeface="Times New Roman" panose="02020603050405020304" pitchFamily="18" charset="0"/>
+                  <a:ea typeface="Times New Roman" panose="02020603050405020304" pitchFamily="18" charset="0"/>
+                </a:rPr>
+                <a:t>Retrieve Multiple Value Sets </a:t>
+              </a:r>
+              <a:br>
+                <a:rPr lang="en-US" sz="1000" dirty="0">
+                  <a:latin typeface="Times New Roman" panose="02020603050405020304" pitchFamily="18" charset="0"/>
+                  <a:ea typeface="Times New Roman" panose="02020603050405020304" pitchFamily="18" charset="0"/>
+                </a:rPr>
+              </a:br>
+              <a:r>
+                <a:rPr lang="en-US" sz="1000" dirty="0">
+                  <a:effectLst/>
+                  <a:latin typeface="Times New Roman" panose="02020603050405020304" pitchFamily="18" charset="0"/>
+                  <a:ea typeface="Times New Roman" panose="02020603050405020304" pitchFamily="18" charset="0"/>
+                </a:rPr>
+                <a:t>[ITI-60]</a:t>
+              </a:r>
+              <a:endParaRPr lang="en-US" sz="1200" dirty="0">
+                <a:effectLst/>
+                <a:latin typeface="Times New Roman" panose="02020603050405020304" pitchFamily="18" charset="0"/>
+                <a:ea typeface="Times New Roman" panose="02020603050405020304" pitchFamily="18" charset="0"/>
+              </a:endParaRPr>
+            </a:p>
+          </p:txBody>
+        </p:sp>
+        <p:sp>
+          <p:nvSpPr>
+            <p:cNvPr id="10" name="Text Box 19">
+              <a:extLst>
+                <a:ext uri="{FF2B5EF4-FFF2-40B4-BE49-F238E27FC236}">
+                  <a16:creationId xmlns:a16="http://schemas.microsoft.com/office/drawing/2014/main" id="{39DE0347-F35B-F24F-B5F5-8C8A8CD55313}"/>
+                </a:ext>
+              </a:extLst>
+            </p:cNvPr>
+            <p:cNvSpPr txBox="1">
+              <a:spLocks noChangeArrowheads="1"/>
+            </p:cNvSpPr>
+            <p:nvPr/>
+          </p:nvSpPr>
+          <p:spPr bwMode="auto">
+            <a:xfrm>
+              <a:off x="18286" y="9539"/>
+              <a:ext cx="18273" cy="5622"/>
+            </a:xfrm>
+            <a:prstGeom prst="rect">
+              <a:avLst/>
+            </a:prstGeom>
+            <a:solidFill>
+              <a:srgbClr val="FFFFFF"/>
+            </a:solidFill>
+            <a:ln>
+              <a:noFill/>
+            </a:ln>
+            <a:extLst>
+              <a:ext uri="{91240B29-F687-4f45-9708-019B960494DF}">
+                <a14:hiddenLine xmlns:lc="http://schemas.openxmlformats.org/drawingml/2006/lockedCanvas" xmlns="" xmlns:mo="http://schemas.microsoft.com/office/mac/office/2008/main" xmlns:mv="urn:schemas-microsoft-com:mac:vml" xmlns:o="urn:schemas-microsoft-com:office:office" xmlns:v="urn:schemas-microsoft-com:vml" xmlns:w10="urn:schemas-microsoft-com:office:word" xmlns:w="http://schemas.openxmlformats.org/wordprocessingml/2006/main" xmlns:a14="http://schemas.microsoft.com/office/drawing/2010/main" xmlns:wps="http://schemas.microsoft.com/office/word/2010/wordprocessingShape" xmlns:wne="http://schemas.microsoft.com/office/word/2006/wordml" xmlns:wpi="http://schemas.microsoft.com/office/word/2010/wordprocessingInk" xmlns:wpg="http://schemas.microsoft.com/office/word/2010/wordprocessingGroup" xmlns:w16se="http://schemas.microsoft.com/office/word/2015/wordml/symex" xmlns:w16="http://schemas.microsoft.com/office/word/2018/wordml" xmlns:w16cid="http://schemas.microsoft.com/office/word/2016/wordml/cid" xmlns:w16cex="http://schemas.microsoft.com/office/word/2018/wordml/cex" xmlns:w15="http://schemas.microsoft.com/office/word/2012/wordml" xmlns:w14="http://schemas.microsoft.com/office/word/2010/wordml" xmlns:wp="http://schemas.openxmlformats.org/drawingml/2006/wordprocessingDrawing" xmlns:wp14="http://schemas.microsoft.com/office/word/2010/wordprocessingDrawing" xmlns:m="http://schemas.openxmlformats.org/officeDocument/2006/math" xmlns:am3d="http://schemas.microsoft.com/office/drawing/2017/model3d" xmlns:aink="http://schemas.microsoft.com/office/drawing/2016/ink" xmlns:mc="http://schemas.openxmlformats.org/markup-compatibility/2006" xmlns:cx8="http://schemas.microsoft.com/office/drawing/2016/5/14/chartex" xmlns:cx7="http://schemas.microsoft.com/office/drawing/2016/5/13/chartex" xmlns:cx6="http://schemas.microsoft.com/office/drawing/2016/5/12/chartex" xmlns:cx5="http://schemas.microsoft.com/office/drawing/2016/5/11/chartex" xmlns:cx4="http://schemas.microsoft.com/office/drawing/2016/5/10/chartex" xmlns:cx3="http://schemas.microsoft.com/office/drawing/2016/5/9/chartex" xmlns:cx2="http://schemas.microsoft.com/office/drawing/2015/10/21/chartex" xmlns:cx1="http://schemas.microsoft.com/office/drawing/2015/9/8/chartex" xmlns:cx="http://schemas.microsoft.com/office/drawing/2014/chartex" xmlns:wpc="http://schemas.microsoft.com/office/word/2010/wordprocessingCanvas" w="9525">
+                  <a:solidFill>
+                    <a:srgbClr val="000000"/>
+                  </a:solidFill>
+                  <a:miter lim="800000"/>
+                  <a:headEnd/>
+                  <a:tailEnd/>
+                </a14:hiddenLine>
+              </a:ext>
+            </a:extLst>
+          </p:spPr>
+          <p:txBody>
+            <a:bodyPr rot="0" vert="horz" wrap="square" lIns="91440" tIns="45720" rIns="91440" bIns="45720" anchor="t" anchorCtr="0" upright="1">
+              <a:noAutofit/>
+            </a:bodyPr>
+            <a:lstStyle/>
+            <a:p>
+              <a:pPr marL="0" marR="0">
+                <a:spcBef>
+                  <a:spcPts val="600"/>
+                </a:spcBef>
+                <a:spcAft>
+                  <a:spcPts val="0"/>
+                </a:spcAft>
+              </a:pPr>
+              <a:r>
+                <a:rPr lang="en-US" sz="1000" dirty="0">
+                  <a:effectLst/>
+                  <a:latin typeface="Times New Roman" panose="02020603050405020304" pitchFamily="18" charset="0"/>
+                  <a:ea typeface="Times New Roman" panose="02020603050405020304" pitchFamily="18" charset="0"/>
+                </a:rPr>
+                <a:t>Retrieve Value Set [ITI-48]</a:t>
+              </a:r>
+              <a:endParaRPr lang="en-US" sz="1200" dirty="0">
+                <a:effectLst/>
+                <a:latin typeface="Times New Roman" panose="02020603050405020304" pitchFamily="18" charset="0"/>
+                <a:ea typeface="Times New Roman" panose="02020603050405020304" pitchFamily="18" charset="0"/>
+              </a:endParaRPr>
+            </a:p>
+          </p:txBody>
+        </p:sp>
+        <p:sp>
+          <p:nvSpPr>
             <p:cNvPr id="5" name="AutoShape 8">
               <a:extLst>
                 <a:ext uri="{FF2B5EF4-FFF2-40B4-BE49-F238E27FC236}">
@@ -3371,14 +3532,14 @@
             </a:ln>
             <a:extLst>
               <a:ext uri="{909E8E84-426E-40dd-AFC4-6F175D3DCCD1}">
-                <a14:hiddenFill xmlns:wpc="http://schemas.microsoft.com/office/word/2010/wordprocessingCanvas" xmlns:cx="http://schemas.microsoft.com/office/drawing/2014/chartex" xmlns:cx1="http://schemas.microsoft.com/office/drawing/2015/9/8/chartex" xmlns:cx2="http://schemas.microsoft.com/office/drawing/2015/10/21/chartex" xmlns:cx3="http://schemas.microsoft.com/office/drawing/2016/5/9/chartex" xmlns:cx4="http://schemas.microsoft.com/office/drawing/2016/5/10/chartex" xmlns:cx5="http://schemas.microsoft.com/office/drawing/2016/5/11/chartex" xmlns:cx6="http://schemas.microsoft.com/office/drawing/2016/5/12/chartex" xmlns:cx7="http://schemas.microsoft.com/office/drawing/2016/5/13/chartex" xmlns:cx8="http://schemas.microsoft.com/office/drawing/2016/5/14/chartex" xmlns:mc="http://schemas.openxmlformats.org/markup-compatibility/2006" xmlns:aink="http://schemas.microsoft.com/office/drawing/2016/ink" xmlns:am3d="http://schemas.microsoft.com/office/drawing/2017/model3d" xmlns:m="http://schemas.openxmlformats.org/officeDocument/2006/math" xmlns:wp14="http://schemas.microsoft.com/office/word/2010/wordprocessingDrawing" xmlns:wp="http://schemas.openxmlformats.org/drawingml/2006/wordprocessingDrawing" xmlns:w14="http://schemas.microsoft.com/office/word/2010/wordml" xmlns:w15="http://schemas.microsoft.com/office/word/2012/wordml" xmlns:w16cex="http://schemas.microsoft.com/office/word/2018/wordml/cex" xmlns:w16cid="http://schemas.microsoft.com/office/word/2016/wordml/cid" xmlns:w16="http://schemas.microsoft.com/office/word/2018/wordml" xmlns:w16se="http://schemas.microsoft.com/office/word/2015/wordml/symex" xmlns:wpg="http://schemas.microsoft.com/office/word/2010/wordprocessingGroup" xmlns:wpi="http://schemas.microsoft.com/office/word/2010/wordprocessingInk" xmlns:wne="http://schemas.microsoft.com/office/word/2006/wordml" xmlns:wps="http://schemas.microsoft.com/office/word/2010/wordprocessingShape" xmlns:a14="http://schemas.microsoft.com/office/drawing/2010/main" xmlns:w="http://schemas.openxmlformats.org/wordprocessingml/2006/main" xmlns:w10="urn:schemas-microsoft-com:office:word" xmlns:v="urn:schemas-microsoft-com:vml" xmlns:o="urn:schemas-microsoft-com:office:office" xmlns:mv="urn:schemas-microsoft-com:mac:vml" xmlns:mo="http://schemas.microsoft.com/office/mac/office/2008/main" xmlns="" xmlns:lc="http://schemas.openxmlformats.org/drawingml/2006/lockedCanvas">
+                <a14:hiddenFill xmlns:lc="http://schemas.openxmlformats.org/drawingml/2006/lockedCanvas" xmlns="" xmlns:mo="http://schemas.microsoft.com/office/mac/office/2008/main" xmlns:mv="urn:schemas-microsoft-com:mac:vml" xmlns:o="urn:schemas-microsoft-com:office:office" xmlns:v="urn:schemas-microsoft-com:vml" xmlns:w10="urn:schemas-microsoft-com:office:word" xmlns:w="http://schemas.openxmlformats.org/wordprocessingml/2006/main" xmlns:a14="http://schemas.microsoft.com/office/drawing/2010/main" xmlns:wps="http://schemas.microsoft.com/office/word/2010/wordprocessingShape" xmlns:wne="http://schemas.microsoft.com/office/word/2006/wordml" xmlns:wpi="http://schemas.microsoft.com/office/word/2010/wordprocessingInk" xmlns:wpg="http://schemas.microsoft.com/office/word/2010/wordprocessingGroup" xmlns:w16se="http://schemas.microsoft.com/office/word/2015/wordml/symex" xmlns:w16="http://schemas.microsoft.com/office/word/2018/wordml" xmlns:w16cid="http://schemas.microsoft.com/office/word/2016/wordml/cid" xmlns:w16cex="http://schemas.microsoft.com/office/word/2018/wordml/cex" xmlns:w15="http://schemas.microsoft.com/office/word/2012/wordml" xmlns:w14="http://schemas.microsoft.com/office/word/2010/wordml" xmlns:wp="http://schemas.openxmlformats.org/drawingml/2006/wordprocessingDrawing" xmlns:wp14="http://schemas.microsoft.com/office/word/2010/wordprocessingDrawing" xmlns:m="http://schemas.openxmlformats.org/officeDocument/2006/math" xmlns:am3d="http://schemas.microsoft.com/office/drawing/2017/model3d" xmlns:aink="http://schemas.microsoft.com/office/drawing/2016/ink" xmlns:mc="http://schemas.openxmlformats.org/markup-compatibility/2006" xmlns:cx8="http://schemas.microsoft.com/office/drawing/2016/5/14/chartex" xmlns:cx7="http://schemas.microsoft.com/office/drawing/2016/5/13/chartex" xmlns:cx6="http://schemas.microsoft.com/office/drawing/2016/5/12/chartex" xmlns:cx5="http://schemas.microsoft.com/office/drawing/2016/5/11/chartex" xmlns:cx4="http://schemas.microsoft.com/office/drawing/2016/5/10/chartex" xmlns:cx3="http://schemas.microsoft.com/office/drawing/2016/5/9/chartex" xmlns:cx2="http://schemas.microsoft.com/office/drawing/2015/10/21/chartex" xmlns:cx1="http://schemas.microsoft.com/office/drawing/2015/9/8/chartex" xmlns:cx="http://schemas.microsoft.com/office/drawing/2014/chartex" xmlns:wpc="http://schemas.microsoft.com/office/word/2010/wordprocessingCanvas">
                   <a:solidFill>
                     <a:srgbClr val="FFFFFF"/>
                   </a:solidFill>
                 </a14:hiddenFill>
               </a:ext>
               <a:ext uri="{91240B29-F687-4f45-9708-019B960494DF}">
-                <a14:hiddenLine xmlns:wpc="http://schemas.microsoft.com/office/word/2010/wordprocessingCanvas" xmlns:cx="http://schemas.microsoft.com/office/drawing/2014/chartex" xmlns:cx1="http://schemas.microsoft.com/office/drawing/2015/9/8/chartex" xmlns:cx2="http://schemas.microsoft.com/office/drawing/2015/10/21/chartex" xmlns:cx3="http://schemas.microsoft.com/office/drawing/2016/5/9/chartex" xmlns:cx4="http://schemas.microsoft.com/office/drawing/2016/5/10/chartex" xmlns:cx5="http://schemas.microsoft.com/office/drawing/2016/5/11/chartex" xmlns:cx6="http://schemas.microsoft.com/office/drawing/2016/5/12/chartex" xmlns:cx7="http://schemas.microsoft.com/office/drawing/2016/5/13/chartex" xmlns:cx8="http://schemas.microsoft.com/office/drawing/2016/5/14/chartex" xmlns:mc="http://schemas.openxmlformats.org/markup-compatibility/2006" xmlns:aink="http://schemas.microsoft.com/office/drawing/2016/ink" xmlns:am3d="http://schemas.microsoft.com/office/drawing/2017/model3d" xmlns:m="http://schemas.openxmlformats.org/officeDocument/2006/math" xmlns:wp14="http://schemas.microsoft.com/office/word/2010/wordprocessingDrawing" xmlns:wp="http://schemas.openxmlformats.org/drawingml/2006/wordprocessingDrawing" xmlns:w14="http://schemas.microsoft.com/office/word/2010/wordml" xmlns:w15="http://schemas.microsoft.com/office/word/2012/wordml" xmlns:w16cex="http://schemas.microsoft.com/office/word/2018/wordml/cex" xmlns:w16cid="http://schemas.microsoft.com/office/word/2016/wordml/cid" xmlns:w16="http://schemas.microsoft.com/office/word/2018/wordml" xmlns:w16se="http://schemas.microsoft.com/office/word/2015/wordml/symex" xmlns:wpg="http://schemas.microsoft.com/office/word/2010/wordprocessingGroup" xmlns:wpi="http://schemas.microsoft.com/office/word/2010/wordprocessingInk" xmlns:wne="http://schemas.microsoft.com/office/word/2006/wordml" xmlns:wps="http://schemas.microsoft.com/office/word/2010/wordprocessingShape" xmlns:a14="http://schemas.microsoft.com/office/drawing/2010/main" xmlns:w="http://schemas.openxmlformats.org/wordprocessingml/2006/main" xmlns:w10="urn:schemas-microsoft-com:office:word" xmlns:v="urn:schemas-microsoft-com:vml" xmlns:o="urn:schemas-microsoft-com:office:office" xmlns:mv="urn:schemas-microsoft-com:mac:vml" xmlns:mo="http://schemas.microsoft.com/office/mac/office/2008/main" xmlns="" xmlns:lc="http://schemas.openxmlformats.org/drawingml/2006/lockedCanvas" w="9525">
+                <a14:hiddenLine xmlns:lc="http://schemas.openxmlformats.org/drawingml/2006/lockedCanvas" xmlns="" xmlns:mo="http://schemas.microsoft.com/office/mac/office/2008/main" xmlns:mv="urn:schemas-microsoft-com:mac:vml" xmlns:o="urn:schemas-microsoft-com:office:office" xmlns:v="urn:schemas-microsoft-com:vml" xmlns:w10="urn:schemas-microsoft-com:office:word" xmlns:w="http://schemas.openxmlformats.org/wordprocessingml/2006/main" xmlns:a14="http://schemas.microsoft.com/office/drawing/2010/main" xmlns:wps="http://schemas.microsoft.com/office/word/2010/wordprocessingShape" xmlns:wne="http://schemas.microsoft.com/office/word/2006/wordml" xmlns:wpi="http://schemas.microsoft.com/office/word/2010/wordprocessingInk" xmlns:wpg="http://schemas.microsoft.com/office/word/2010/wordprocessingGroup" xmlns:w16se="http://schemas.microsoft.com/office/word/2015/wordml/symex" xmlns:w16="http://schemas.microsoft.com/office/word/2018/wordml" xmlns:w16cid="http://schemas.microsoft.com/office/word/2016/wordml/cid" xmlns:w16cex="http://schemas.microsoft.com/office/word/2018/wordml/cex" xmlns:w15="http://schemas.microsoft.com/office/word/2012/wordml" xmlns:w14="http://schemas.microsoft.com/office/word/2010/wordml" xmlns:wp="http://schemas.openxmlformats.org/drawingml/2006/wordprocessingDrawing" xmlns:wp14="http://schemas.microsoft.com/office/word/2010/wordprocessingDrawing" xmlns:m="http://schemas.openxmlformats.org/officeDocument/2006/math" xmlns:am3d="http://schemas.microsoft.com/office/drawing/2017/model3d" xmlns:aink="http://schemas.microsoft.com/office/drawing/2016/ink" xmlns:mc="http://schemas.openxmlformats.org/markup-compatibility/2006" xmlns:cx8="http://schemas.microsoft.com/office/drawing/2016/5/14/chartex" xmlns:cx7="http://schemas.microsoft.com/office/drawing/2016/5/13/chartex" xmlns:cx6="http://schemas.microsoft.com/office/drawing/2016/5/12/chartex" xmlns:cx5="http://schemas.microsoft.com/office/drawing/2016/5/11/chartex" xmlns:cx4="http://schemas.microsoft.com/office/drawing/2016/5/10/chartex" xmlns:cx3="http://schemas.microsoft.com/office/drawing/2016/5/9/chartex" xmlns:cx2="http://schemas.microsoft.com/office/drawing/2015/10/21/chartex" xmlns:cx1="http://schemas.microsoft.com/office/drawing/2015/9/8/chartex" xmlns:cx="http://schemas.microsoft.com/office/drawing/2014/chartex" xmlns:wpc="http://schemas.microsoft.com/office/word/2010/wordprocessingCanvas" w="9525">
                   <a:solidFill>
                     <a:srgbClr val="000000"/>
                   </a:solidFill>
@@ -3447,8 +3608,23 @@
                   <a:spcPts val="0"/>
                 </a:spcAft>
               </a:pPr>
+              <a:endParaRPr lang="en-US" sz="1200" dirty="0">
+                <a:effectLst/>
+                <a:latin typeface="Times New Roman" panose="02020603050405020304" pitchFamily="18" charset="0"/>
+                <a:ea typeface="Times New Roman" panose="02020603050405020304" pitchFamily="18" charset="0"/>
+              </a:endParaRPr>
+            </a:p>
+            <a:p>
+              <a:pPr marL="0" marR="0">
+                <a:spcBef>
+                  <a:spcPts val="600"/>
+                </a:spcBef>
+                <a:spcAft>
+                  <a:spcPts val="0"/>
+                </a:spcAft>
+              </a:pPr>
               <a:r>
-                <a:rPr lang="en-US" sz="1200">
+                <a:rPr lang="en-US" sz="1200" dirty="0">
                   <a:effectLst/>
                   <a:latin typeface="Times New Roman" panose="02020603050405020304" pitchFamily="18" charset="0"/>
                   <a:ea typeface="Times New Roman" panose="02020603050405020304" pitchFamily="18" charset="0"/>
@@ -3506,8 +3682,23 @@
                   <a:spcPts val="0"/>
                 </a:spcAft>
               </a:pPr>
+              <a:endParaRPr lang="en-US" sz="1200" dirty="0">
+                <a:effectLst/>
+                <a:latin typeface="Times New Roman" panose="02020603050405020304" pitchFamily="18" charset="0"/>
+                <a:ea typeface="Times New Roman" panose="02020603050405020304" pitchFamily="18" charset="0"/>
+              </a:endParaRPr>
+            </a:p>
+            <a:p>
+              <a:pPr marL="0" marR="0">
+                <a:spcBef>
+                  <a:spcPts val="600"/>
+                </a:spcBef>
+                <a:spcAft>
+                  <a:spcPts val="0"/>
+                </a:spcAft>
+              </a:pPr>
               <a:r>
-                <a:rPr lang="en-US" sz="1200">
+                <a:rPr lang="en-US" sz="1200" dirty="0">
                   <a:effectLst/>
                   <a:latin typeface="Times New Roman" panose="02020603050405020304" pitchFamily="18" charset="0"/>
                   <a:ea typeface="Times New Roman" panose="02020603050405020304" pitchFamily="18" charset="0"/>
@@ -3531,7 +3722,7 @@
           </p:nvCxnSpPr>
           <p:spPr bwMode="auto">
             <a:xfrm flipH="1">
-              <a:off x="17160" y="11431"/>
+              <a:off x="17160" y="12707"/>
               <a:ext cx="18273" cy="7"/>
             </a:xfrm>
             <a:prstGeom prst="line">
@@ -3548,7 +3739,7 @@
             </a:ln>
             <a:extLst>
               <a:ext uri="{909E8E84-426E-40dd-AFC4-6F175D3DCCD1}">
-                <a14:hiddenFill xmlns:wpc="http://schemas.microsoft.com/office/word/2010/wordprocessingCanvas" xmlns:cx="http://schemas.microsoft.com/office/drawing/2014/chartex" xmlns:cx1="http://schemas.microsoft.com/office/drawing/2015/9/8/chartex" xmlns:cx2="http://schemas.microsoft.com/office/drawing/2015/10/21/chartex" xmlns:cx3="http://schemas.microsoft.com/office/drawing/2016/5/9/chartex" xmlns:cx4="http://schemas.microsoft.com/office/drawing/2016/5/10/chartex" xmlns:cx5="http://schemas.microsoft.com/office/drawing/2016/5/11/chartex" xmlns:cx6="http://schemas.microsoft.com/office/drawing/2016/5/12/chartex" xmlns:cx7="http://schemas.microsoft.com/office/drawing/2016/5/13/chartex" xmlns:cx8="http://schemas.microsoft.com/office/drawing/2016/5/14/chartex" xmlns:mc="http://schemas.openxmlformats.org/markup-compatibility/2006" xmlns:aink="http://schemas.microsoft.com/office/drawing/2016/ink" xmlns:am3d="http://schemas.microsoft.com/office/drawing/2017/model3d" xmlns:m="http://schemas.openxmlformats.org/officeDocument/2006/math" xmlns:wp14="http://schemas.microsoft.com/office/word/2010/wordprocessingDrawing" xmlns:wp="http://schemas.openxmlformats.org/drawingml/2006/wordprocessingDrawing" xmlns:w14="http://schemas.microsoft.com/office/word/2010/wordml" xmlns:w15="http://schemas.microsoft.com/office/word/2012/wordml" xmlns:w16cex="http://schemas.microsoft.com/office/word/2018/wordml/cex" xmlns:w16cid="http://schemas.microsoft.com/office/word/2016/wordml/cid" xmlns:w16="http://schemas.microsoft.com/office/word/2018/wordml" xmlns:w16se="http://schemas.microsoft.com/office/word/2015/wordml/symex" xmlns:wpg="http://schemas.microsoft.com/office/word/2010/wordprocessingGroup" xmlns:wpi="http://schemas.microsoft.com/office/word/2010/wordprocessingInk" xmlns:wne="http://schemas.microsoft.com/office/word/2006/wordml" xmlns:wps="http://schemas.microsoft.com/office/word/2010/wordprocessingShape" xmlns:a14="http://schemas.microsoft.com/office/drawing/2010/main" xmlns:w="http://schemas.openxmlformats.org/wordprocessingml/2006/main" xmlns:w10="urn:schemas-microsoft-com:office:word" xmlns:v="urn:schemas-microsoft-com:vml" xmlns:o="urn:schemas-microsoft-com:office:office" xmlns:mv="urn:schemas-microsoft-com:mac:vml" xmlns:mo="http://schemas.microsoft.com/office/mac/office/2008/main" xmlns="" xmlns:lc="http://schemas.openxmlformats.org/drawingml/2006/lockedCanvas">
+                <a14:hiddenFill xmlns:lc="http://schemas.openxmlformats.org/drawingml/2006/lockedCanvas" xmlns="" xmlns:mo="http://schemas.microsoft.com/office/mac/office/2008/main" xmlns:mv="urn:schemas-microsoft-com:mac:vml" xmlns:o="urn:schemas-microsoft-com:office:office" xmlns:v="urn:schemas-microsoft-com:vml" xmlns:w10="urn:schemas-microsoft-com:office:word" xmlns:w="http://schemas.openxmlformats.org/wordprocessingml/2006/main" xmlns:a14="http://schemas.microsoft.com/office/drawing/2010/main" xmlns:wps="http://schemas.microsoft.com/office/word/2010/wordprocessingShape" xmlns:wne="http://schemas.microsoft.com/office/word/2006/wordml" xmlns:wpi="http://schemas.microsoft.com/office/word/2010/wordprocessingInk" xmlns:wpg="http://schemas.microsoft.com/office/word/2010/wordprocessingGroup" xmlns:w16se="http://schemas.microsoft.com/office/word/2015/wordml/symex" xmlns:w16="http://schemas.microsoft.com/office/word/2018/wordml" xmlns:w16cid="http://schemas.microsoft.com/office/word/2016/wordml/cid" xmlns:w16cex="http://schemas.microsoft.com/office/word/2018/wordml/cex" xmlns:w15="http://schemas.microsoft.com/office/word/2012/wordml" xmlns:w14="http://schemas.microsoft.com/office/word/2010/wordml" xmlns:wp="http://schemas.openxmlformats.org/drawingml/2006/wordprocessingDrawing" xmlns:wp14="http://schemas.microsoft.com/office/word/2010/wordprocessingDrawing" xmlns:m="http://schemas.openxmlformats.org/officeDocument/2006/math" xmlns:am3d="http://schemas.microsoft.com/office/drawing/2017/model3d" xmlns:aink="http://schemas.microsoft.com/office/drawing/2016/ink" xmlns:mc="http://schemas.openxmlformats.org/markup-compatibility/2006" xmlns:cx8="http://schemas.microsoft.com/office/drawing/2016/5/14/chartex" xmlns:cx7="http://schemas.microsoft.com/office/drawing/2016/5/13/chartex" xmlns:cx6="http://schemas.microsoft.com/office/drawing/2016/5/12/chartex" xmlns:cx5="http://schemas.microsoft.com/office/drawing/2016/5/11/chartex" xmlns:cx4="http://schemas.microsoft.com/office/drawing/2016/5/10/chartex" xmlns:cx3="http://schemas.microsoft.com/office/drawing/2016/5/9/chartex" xmlns:cx2="http://schemas.microsoft.com/office/drawing/2015/10/21/chartex" xmlns:cx1="http://schemas.microsoft.com/office/drawing/2015/9/8/chartex" xmlns:cx="http://schemas.microsoft.com/office/drawing/2014/chartex" xmlns:wpc="http://schemas.microsoft.com/office/word/2010/wordprocessingCanvas">
                   <a:noFill/>
                 </a14:hiddenFill>
               </a:ext>
@@ -3586,155 +3777,13 @@
             </a:ln>
             <a:extLst>
               <a:ext uri="{909E8E84-426E-40dd-AFC4-6F175D3DCCD1}">
-                <a14:hiddenFill xmlns:wpc="http://schemas.microsoft.com/office/word/2010/wordprocessingCanvas" xmlns:cx="http://schemas.microsoft.com/office/drawing/2014/chartex" xmlns:cx1="http://schemas.microsoft.com/office/drawing/2015/9/8/chartex" xmlns:cx2="http://schemas.microsoft.com/office/drawing/2015/10/21/chartex" xmlns:cx3="http://schemas.microsoft.com/office/drawing/2016/5/9/chartex" xmlns:cx4="http://schemas.microsoft.com/office/drawing/2016/5/10/chartex" xmlns:cx5="http://schemas.microsoft.com/office/drawing/2016/5/11/chartex" xmlns:cx6="http://schemas.microsoft.com/office/drawing/2016/5/12/chartex" xmlns:cx7="http://schemas.microsoft.com/office/drawing/2016/5/13/chartex" xmlns:cx8="http://schemas.microsoft.com/office/drawing/2016/5/14/chartex" xmlns:mc="http://schemas.openxmlformats.org/markup-compatibility/2006" xmlns:aink="http://schemas.microsoft.com/office/drawing/2016/ink" xmlns:am3d="http://schemas.microsoft.com/office/drawing/2017/model3d" xmlns:m="http://schemas.openxmlformats.org/officeDocument/2006/math" xmlns:wp14="http://schemas.microsoft.com/office/word/2010/wordprocessingDrawing" xmlns:wp="http://schemas.openxmlformats.org/drawingml/2006/wordprocessingDrawing" xmlns:w14="http://schemas.microsoft.com/office/word/2010/wordml" xmlns:w15="http://schemas.microsoft.com/office/word/2012/wordml" xmlns:w16cex="http://schemas.microsoft.com/office/word/2018/wordml/cex" xmlns:w16cid="http://schemas.microsoft.com/office/word/2016/wordml/cid" xmlns:w16="http://schemas.microsoft.com/office/word/2018/wordml" xmlns:w16se="http://schemas.microsoft.com/office/word/2015/wordml/symex" xmlns:wpg="http://schemas.microsoft.com/office/word/2010/wordprocessingGroup" xmlns:wpi="http://schemas.microsoft.com/office/word/2010/wordprocessingInk" xmlns:wne="http://schemas.microsoft.com/office/word/2006/wordml" xmlns:wps="http://schemas.microsoft.com/office/word/2010/wordprocessingShape" xmlns:a14="http://schemas.microsoft.com/office/drawing/2010/main" xmlns:w="http://schemas.openxmlformats.org/wordprocessingml/2006/main" xmlns:w10="urn:schemas-microsoft-com:office:word" xmlns:v="urn:schemas-microsoft-com:vml" xmlns:o="urn:schemas-microsoft-com:office:office" xmlns:mv="urn:schemas-microsoft-com:mac:vml" xmlns:mo="http://schemas.microsoft.com/office/mac/office/2008/main" xmlns="" xmlns:lc="http://schemas.openxmlformats.org/drawingml/2006/lockedCanvas">
+                <a14:hiddenFill xmlns:lc="http://schemas.openxmlformats.org/drawingml/2006/lockedCanvas" xmlns="" xmlns:mo="http://schemas.microsoft.com/office/mac/office/2008/main" xmlns:mv="urn:schemas-microsoft-com:mac:vml" xmlns:o="urn:schemas-microsoft-com:office:office" xmlns:v="urn:schemas-microsoft-com:vml" xmlns:w10="urn:schemas-microsoft-com:office:word" xmlns:w="http://schemas.openxmlformats.org/wordprocessingml/2006/main" xmlns:a14="http://schemas.microsoft.com/office/drawing/2010/main" xmlns:wps="http://schemas.microsoft.com/office/word/2010/wordprocessingShape" xmlns:wne="http://schemas.microsoft.com/office/word/2006/wordml" xmlns:wpi="http://schemas.microsoft.com/office/word/2010/wordprocessingInk" xmlns:wpg="http://schemas.microsoft.com/office/word/2010/wordprocessingGroup" xmlns:w16se="http://schemas.microsoft.com/office/word/2015/wordml/symex" xmlns:w16="http://schemas.microsoft.com/office/word/2018/wordml" xmlns:w16cid="http://schemas.microsoft.com/office/word/2016/wordml/cid" xmlns:w16cex="http://schemas.microsoft.com/office/word/2018/wordml/cex" xmlns:w15="http://schemas.microsoft.com/office/word/2012/wordml" xmlns:w14="http://schemas.microsoft.com/office/word/2010/wordml" xmlns:wp="http://schemas.openxmlformats.org/drawingml/2006/wordprocessingDrawing" xmlns:wp14="http://schemas.microsoft.com/office/word/2010/wordprocessingDrawing" xmlns:m="http://schemas.openxmlformats.org/officeDocument/2006/math" xmlns:am3d="http://schemas.microsoft.com/office/drawing/2017/model3d" xmlns:aink="http://schemas.microsoft.com/office/drawing/2016/ink" xmlns:mc="http://schemas.openxmlformats.org/markup-compatibility/2006" xmlns:cx8="http://schemas.microsoft.com/office/drawing/2016/5/14/chartex" xmlns:cx7="http://schemas.microsoft.com/office/drawing/2016/5/13/chartex" xmlns:cx6="http://schemas.microsoft.com/office/drawing/2016/5/12/chartex" xmlns:cx5="http://schemas.microsoft.com/office/drawing/2016/5/11/chartex" xmlns:cx4="http://schemas.microsoft.com/office/drawing/2016/5/10/chartex" xmlns:cx3="http://schemas.microsoft.com/office/drawing/2016/5/9/chartex" xmlns:cx2="http://schemas.microsoft.com/office/drawing/2015/10/21/chartex" xmlns:cx1="http://schemas.microsoft.com/office/drawing/2015/9/8/chartex" xmlns:cx="http://schemas.microsoft.com/office/drawing/2014/chartex" xmlns:wpc="http://schemas.microsoft.com/office/word/2010/wordprocessingCanvas">
                   <a:noFill/>
                 </a14:hiddenFill>
               </a:ext>
             </a:extLst>
           </p:spPr>
         </p:cxnSp>
-        <p:sp>
-          <p:nvSpPr>
-            <p:cNvPr id="10" name="Text Box 19">
-              <a:extLst>
-                <a:ext uri="{FF2B5EF4-FFF2-40B4-BE49-F238E27FC236}">
-                  <a16:creationId xmlns:a16="http://schemas.microsoft.com/office/drawing/2014/main" id="{39DE0347-F35B-F24F-B5F5-8C8A8CD55313}"/>
-                </a:ext>
-              </a:extLst>
-            </p:cNvPr>
-            <p:cNvSpPr txBox="1">
-              <a:spLocks noChangeArrowheads="1"/>
-            </p:cNvSpPr>
-            <p:nvPr/>
-          </p:nvSpPr>
-          <p:spPr bwMode="auto">
-            <a:xfrm>
-              <a:off x="18286" y="5711"/>
-              <a:ext cx="13731" cy="5720"/>
-            </a:xfrm>
-            <a:prstGeom prst="rect">
-              <a:avLst/>
-            </a:prstGeom>
-            <a:solidFill>
-              <a:srgbClr val="FFFFFF"/>
-            </a:solidFill>
-            <a:ln>
-              <a:noFill/>
-            </a:ln>
-            <a:extLst>
-              <a:ext uri="{91240B29-F687-4f45-9708-019B960494DF}">
-                <a14:hiddenLine xmlns:wpc="http://schemas.microsoft.com/office/word/2010/wordprocessingCanvas" xmlns:cx="http://schemas.microsoft.com/office/drawing/2014/chartex" xmlns:cx1="http://schemas.microsoft.com/office/drawing/2015/9/8/chartex" xmlns:cx2="http://schemas.microsoft.com/office/drawing/2015/10/21/chartex" xmlns:cx3="http://schemas.microsoft.com/office/drawing/2016/5/9/chartex" xmlns:cx4="http://schemas.microsoft.com/office/drawing/2016/5/10/chartex" xmlns:cx5="http://schemas.microsoft.com/office/drawing/2016/5/11/chartex" xmlns:cx6="http://schemas.microsoft.com/office/drawing/2016/5/12/chartex" xmlns:cx7="http://schemas.microsoft.com/office/drawing/2016/5/13/chartex" xmlns:cx8="http://schemas.microsoft.com/office/drawing/2016/5/14/chartex" xmlns:mc="http://schemas.openxmlformats.org/markup-compatibility/2006" xmlns:aink="http://schemas.microsoft.com/office/drawing/2016/ink" xmlns:am3d="http://schemas.microsoft.com/office/drawing/2017/model3d" xmlns:m="http://schemas.openxmlformats.org/officeDocument/2006/math" xmlns:wp14="http://schemas.microsoft.com/office/word/2010/wordprocessingDrawing" xmlns:wp="http://schemas.openxmlformats.org/drawingml/2006/wordprocessingDrawing" xmlns:w14="http://schemas.microsoft.com/office/word/2010/wordml" xmlns:w15="http://schemas.microsoft.com/office/word/2012/wordml" xmlns:w16cex="http://schemas.microsoft.com/office/word/2018/wordml/cex" xmlns:w16cid="http://schemas.microsoft.com/office/word/2016/wordml/cid" xmlns:w16="http://schemas.microsoft.com/office/word/2018/wordml" xmlns:w16se="http://schemas.microsoft.com/office/word/2015/wordml/symex" xmlns:wpg="http://schemas.microsoft.com/office/word/2010/wordprocessingGroup" xmlns:wpi="http://schemas.microsoft.com/office/word/2010/wordprocessingInk" xmlns:wne="http://schemas.microsoft.com/office/word/2006/wordml" xmlns:wps="http://schemas.microsoft.com/office/word/2010/wordprocessingShape" xmlns:a14="http://schemas.microsoft.com/office/drawing/2010/main" xmlns:w="http://schemas.openxmlformats.org/wordprocessingml/2006/main" xmlns:w10="urn:schemas-microsoft-com:office:word" xmlns:v="urn:schemas-microsoft-com:vml" xmlns:o="urn:schemas-microsoft-com:office:office" xmlns:mv="urn:schemas-microsoft-com:mac:vml" xmlns:mo="http://schemas.microsoft.com/office/mac/office/2008/main" xmlns="" xmlns:lc="http://schemas.openxmlformats.org/drawingml/2006/lockedCanvas" w="9525">
-                  <a:solidFill>
-                    <a:srgbClr val="000000"/>
-                  </a:solidFill>
-                  <a:miter lim="800000"/>
-                  <a:headEnd/>
-                  <a:tailEnd/>
-                </a14:hiddenLine>
-              </a:ext>
-            </a:extLst>
-          </p:spPr>
-          <p:txBody>
-            <a:bodyPr rot="0" vert="horz" wrap="square" lIns="91440" tIns="45720" rIns="91440" bIns="45720" anchor="t" anchorCtr="0" upright="1">
-              <a:noAutofit/>
-            </a:bodyPr>
-            <a:lstStyle/>
-            <a:p>
-              <a:pPr marL="0" marR="0">
-                <a:spcBef>
-                  <a:spcPts val="600"/>
-                </a:spcBef>
-                <a:spcAft>
-                  <a:spcPts val="0"/>
-                </a:spcAft>
-              </a:pPr>
-              <a:r>
-                <a:rPr lang="en-US" sz="1000">
-                  <a:effectLst/>
-                  <a:latin typeface="Times New Roman" panose="02020603050405020304" pitchFamily="18" charset="0"/>
-                  <a:ea typeface="Times New Roman" panose="02020603050405020304" pitchFamily="18" charset="0"/>
-                </a:rPr>
-                <a:t>Retrieve Value Set [ITI-48]</a:t>
-              </a:r>
-              <a:endParaRPr lang="en-US" sz="1200">
-                <a:effectLst/>
-                <a:latin typeface="Times New Roman" panose="02020603050405020304" pitchFamily="18" charset="0"/>
-                <a:ea typeface="Times New Roman" panose="02020603050405020304" pitchFamily="18" charset="0"/>
-              </a:endParaRPr>
-            </a:p>
-          </p:txBody>
-        </p:sp>
-        <p:sp>
-          <p:nvSpPr>
-            <p:cNvPr id="11" name="Text Box 20">
-              <a:extLst>
-                <a:ext uri="{FF2B5EF4-FFF2-40B4-BE49-F238E27FC236}">
-                  <a16:creationId xmlns:a16="http://schemas.microsoft.com/office/drawing/2014/main" id="{B36BE77E-DEB3-824B-89B5-71FACF88A51F}"/>
-                </a:ext>
-              </a:extLst>
-            </p:cNvPr>
-            <p:cNvSpPr txBox="1">
-              <a:spLocks noChangeArrowheads="1"/>
-            </p:cNvSpPr>
-            <p:nvPr/>
-          </p:nvSpPr>
-          <p:spPr bwMode="auto">
-            <a:xfrm>
-              <a:off x="18288" y="21713"/>
-              <a:ext cx="16017" cy="4616"/>
-            </a:xfrm>
-            <a:prstGeom prst="rect">
-              <a:avLst/>
-            </a:prstGeom>
-            <a:solidFill>
-              <a:srgbClr val="FFFFFF"/>
-            </a:solidFill>
-            <a:ln>
-              <a:noFill/>
-            </a:ln>
-            <a:extLst>
-              <a:ext uri="{91240B29-F687-4f45-9708-019B960494DF}">
-                <a14:hiddenLine xmlns:wpc="http://schemas.microsoft.com/office/word/2010/wordprocessingCanvas" xmlns:cx="http://schemas.microsoft.com/office/drawing/2014/chartex" xmlns:cx1="http://schemas.microsoft.com/office/drawing/2015/9/8/chartex" xmlns:cx2="http://schemas.microsoft.com/office/drawing/2015/10/21/chartex" xmlns:cx3="http://schemas.microsoft.com/office/drawing/2016/5/9/chartex" xmlns:cx4="http://schemas.microsoft.com/office/drawing/2016/5/10/chartex" xmlns:cx5="http://schemas.microsoft.com/office/drawing/2016/5/11/chartex" xmlns:cx6="http://schemas.microsoft.com/office/drawing/2016/5/12/chartex" xmlns:cx7="http://schemas.microsoft.com/office/drawing/2016/5/13/chartex" xmlns:cx8="http://schemas.microsoft.com/office/drawing/2016/5/14/chartex" xmlns:mc="http://schemas.openxmlformats.org/markup-compatibility/2006" xmlns:aink="http://schemas.microsoft.com/office/drawing/2016/ink" xmlns:am3d="http://schemas.microsoft.com/office/drawing/2017/model3d" xmlns:m="http://schemas.openxmlformats.org/officeDocument/2006/math" xmlns:wp14="http://schemas.microsoft.com/office/word/2010/wordprocessingDrawing" xmlns:wp="http://schemas.openxmlformats.org/drawingml/2006/wordprocessingDrawing" xmlns:w14="http://schemas.microsoft.com/office/word/2010/wordml" xmlns:w15="http://schemas.microsoft.com/office/word/2012/wordml" xmlns:w16cex="http://schemas.microsoft.com/office/word/2018/wordml/cex" xmlns:w16cid="http://schemas.microsoft.com/office/word/2016/wordml/cid" xmlns:w16="http://schemas.microsoft.com/office/word/2018/wordml" xmlns:w16se="http://schemas.microsoft.com/office/word/2015/wordml/symex" xmlns:wpg="http://schemas.microsoft.com/office/word/2010/wordprocessingGroup" xmlns:wpi="http://schemas.microsoft.com/office/word/2010/wordprocessingInk" xmlns:wne="http://schemas.microsoft.com/office/word/2006/wordml" xmlns:wps="http://schemas.microsoft.com/office/word/2010/wordprocessingShape" xmlns:a14="http://schemas.microsoft.com/office/drawing/2010/main" xmlns:w="http://schemas.openxmlformats.org/wordprocessingml/2006/main" xmlns:w10="urn:schemas-microsoft-com:office:word" xmlns:v="urn:schemas-microsoft-com:vml" xmlns:o="urn:schemas-microsoft-com:office:office" xmlns:mv="urn:schemas-microsoft-com:mac:vml" xmlns:mo="http://schemas.microsoft.com/office/mac/office/2008/main" xmlns="" xmlns:lc="http://schemas.openxmlformats.org/drawingml/2006/lockedCanvas" w="9525">
-                  <a:solidFill>
-                    <a:srgbClr val="000000"/>
-                  </a:solidFill>
-                  <a:miter lim="800000"/>
-                  <a:headEnd/>
-                  <a:tailEnd/>
-                </a14:hiddenLine>
-              </a:ext>
-            </a:extLst>
-          </p:spPr>
-          <p:txBody>
-            <a:bodyPr rot="0" vert="horz" wrap="square" lIns="91440" tIns="45720" rIns="91440" bIns="45720" anchor="t" anchorCtr="0" upright="1">
-              <a:noAutofit/>
-            </a:bodyPr>
-            <a:lstStyle/>
-            <a:p>
-              <a:pPr marL="0" marR="0">
-                <a:spcBef>
-                  <a:spcPts val="600"/>
-                </a:spcBef>
-                <a:spcAft>
-                  <a:spcPts val="0"/>
-                </a:spcAft>
-              </a:pPr>
-              <a:r>
-                <a:rPr lang="en-US" sz="1000">
-                  <a:effectLst/>
-                  <a:latin typeface="Times New Roman" panose="02020603050405020304" pitchFamily="18" charset="0"/>
-                  <a:ea typeface="Times New Roman" panose="02020603050405020304" pitchFamily="18" charset="0"/>
-                </a:rPr>
-                <a:t>Retrieve Multiple Value Sets [ITI-60]</a:t>
-              </a:r>
-              <a:endParaRPr lang="en-US" sz="1200">
-                <a:effectLst/>
-                <a:latin typeface="Times New Roman" panose="02020603050405020304" pitchFamily="18" charset="0"/>
-                <a:ea typeface="Times New Roman" panose="02020603050405020304" pitchFamily="18" charset="0"/>
-              </a:endParaRPr>
-            </a:p>
-          </p:txBody>
-        </p:sp>
       </p:grpSp>
     </p:spTree>
     <p:extLst>

</xml_diff>